<commit_message>
more stuff to here
</commit_message>
<xml_diff>
--- a/Ooh look a title.pptx
+++ b/Ooh look a title.pptx
@@ -17,8 +17,9 @@
     <p:sldId id="263" r:id="rId11"/>
     <p:sldId id="265" r:id="rId12"/>
     <p:sldId id="268" r:id="rId13"/>
-    <p:sldId id="269" r:id="rId14"/>
-    <p:sldId id="264" r:id="rId15"/>
+    <p:sldId id="270" r:id="rId14"/>
+    <p:sldId id="269" r:id="rId15"/>
+    <p:sldId id="264" r:id="rId16"/>
   </p:sldIdLst>
   <p:sldSz cx="12192000" cy="6858000"/>
   <p:notesSz cx="6858000" cy="9144000"/>
@@ -125,10 +126,6 @@
 </p:presentation>
 </file>
 
-<file path=ppt/revisionInfo.xml><?xml version="1.0" encoding="utf-8"?>
-<p1510:revInfo xmlns:a="http://schemas.openxmlformats.org/drawingml/2006/main" xmlns:r="http://schemas.openxmlformats.org/officeDocument/2006/relationships" xmlns:p1510="http://schemas.microsoft.com/office/powerpoint/2015/10/main"/>
-</file>
-
 <file path=ppt/slideLayouts/slideLayout1.xml><?xml version="1.0" encoding="utf-8"?>
 <p:sldLayout xmlns:a="http://schemas.openxmlformats.org/drawingml/2006/main" xmlns:r="http://schemas.openxmlformats.org/officeDocument/2006/relationships" xmlns:p="http://schemas.openxmlformats.org/presentationml/2006/main" showMasterSp="0" type="title" preserve="1">
   <p:cSld name="Title Slide">
@@ -298,7 +295,7 @@
           <a:p>
             <a:fld id="{4AAD347D-5ACD-4C99-B74B-A9C85AD731AF}" type="datetimeFigureOut">
               <a:rPr lang="en-US" smtClean="0"/>
-              <a:t>1/28/2019</a:t>
+              <a:t>1/31/2019</a:t>
             </a:fld>
             <a:endParaRPr lang="en-US" dirty="0"/>
           </a:p>
@@ -628,7 +625,7 @@
           <a:p>
             <a:fld id="{4509A250-FF31-4206-8172-F9D3106AACB1}" type="datetimeFigureOut">
               <a:rPr lang="en-US" smtClean="0"/>
-              <a:t>1/28/2019</a:t>
+              <a:t>1/31/2019</a:t>
             </a:fld>
             <a:endParaRPr lang="en-US" dirty="0"/>
           </a:p>
@@ -808,7 +805,7 @@
           <a:p>
             <a:fld id="{4509A250-FF31-4206-8172-F9D3106AACB1}" type="datetimeFigureOut">
               <a:rPr lang="en-US" smtClean="0"/>
-              <a:t>1/28/2019</a:t>
+              <a:t>1/31/2019</a:t>
             </a:fld>
             <a:endParaRPr lang="en-US" dirty="0"/>
           </a:p>
@@ -978,7 +975,7 @@
           <a:p>
             <a:fld id="{4509A250-FF31-4206-8172-F9D3106AACB1}" type="datetimeFigureOut">
               <a:rPr lang="en-US" smtClean="0"/>
-              <a:t>1/28/2019</a:t>
+              <a:t>1/31/2019</a:t>
             </a:fld>
             <a:endParaRPr lang="en-US" dirty="0"/>
           </a:p>
@@ -1255,7 +1252,7 @@
           <a:p>
             <a:fld id="{9796027F-7875-4030-9381-8BD8C4F21935}" type="datetimeFigureOut">
               <a:rPr lang="en-US" smtClean="0"/>
-              <a:t>1/28/2019</a:t>
+              <a:t>1/31/2019</a:t>
             </a:fld>
             <a:endParaRPr lang="en-US" dirty="0"/>
           </a:p>
@@ -1649,7 +1646,7 @@
           <a:p>
             <a:fld id="{9796027F-7875-4030-9381-8BD8C4F21935}" type="datetimeFigureOut">
               <a:rPr lang="en-US" smtClean="0"/>
-              <a:t>1/28/2019</a:t>
+              <a:t>1/31/2019</a:t>
             </a:fld>
             <a:endParaRPr lang="en-US" dirty="0"/>
           </a:p>
@@ -2126,7 +2123,7 @@
           <a:p>
             <a:fld id="{9796027F-7875-4030-9381-8BD8C4F21935}" type="datetimeFigureOut">
               <a:rPr lang="en-US" smtClean="0"/>
-              <a:t>1/28/2019</a:t>
+              <a:t>1/31/2019</a:t>
             </a:fld>
             <a:endParaRPr lang="en-US" dirty="0"/>
           </a:p>
@@ -2244,7 +2241,7 @@
           <a:p>
             <a:fld id="{4509A250-FF31-4206-8172-F9D3106AACB1}" type="datetimeFigureOut">
               <a:rPr lang="en-US" smtClean="0"/>
-              <a:t>1/28/2019</a:t>
+              <a:t>1/31/2019</a:t>
             </a:fld>
             <a:endParaRPr lang="en-US" dirty="0"/>
           </a:p>
@@ -2339,7 +2336,7 @@
           <a:p>
             <a:fld id="{4509A250-FF31-4206-8172-F9D3106AACB1}" type="datetimeFigureOut">
               <a:rPr lang="en-US" smtClean="0"/>
-              <a:t>1/28/2019</a:t>
+              <a:t>1/31/2019</a:t>
             </a:fld>
             <a:endParaRPr lang="en-US" dirty="0"/>
           </a:p>
@@ -2685,7 +2682,7 @@
           <a:p>
             <a:fld id="{4509A250-FF31-4206-8172-F9D3106AACB1}" type="datetimeFigureOut">
               <a:rPr lang="en-US" smtClean="0"/>
-              <a:t>1/28/2019</a:t>
+              <a:t>1/31/2019</a:t>
             </a:fld>
             <a:endParaRPr lang="en-US" dirty="0"/>
           </a:p>
@@ -3073,7 +3070,7 @@
           <a:p>
             <a:fld id="{4509A250-FF31-4206-8172-F9D3106AACB1}" type="datetimeFigureOut">
               <a:rPr lang="en-US" smtClean="0"/>
-              <a:t>1/28/2019</a:t>
+              <a:t>1/31/2019</a:t>
             </a:fld>
             <a:endParaRPr lang="en-US" dirty="0"/>
           </a:p>
@@ -3351,7 +3348,7 @@
           <a:p>
             <a:fld id="{4AAD347D-5ACD-4C99-B74B-A9C85AD731AF}" type="datetimeFigureOut">
               <a:rPr lang="en-US" smtClean="0"/>
-              <a:t>1/28/2019</a:t>
+              <a:t>1/31/2019</a:t>
             </a:fld>
             <a:endParaRPr lang="en-US" dirty="0"/>
           </a:p>
@@ -5137,6 +5134,99 @@
 <file path=ppt/slides/slide13.xml><?xml version="1.0" encoding="utf-8"?>
 <p:sld xmlns:a="http://schemas.openxmlformats.org/drawingml/2006/main" xmlns:r="http://schemas.openxmlformats.org/officeDocument/2006/relationships" xmlns:p="http://schemas.openxmlformats.org/presentationml/2006/main">
   <p:cSld>
+    <p:spTree>
+      <p:nvGrpSpPr>
+        <p:cNvPr id="1" name=""/>
+        <p:cNvGrpSpPr/>
+        <p:nvPr/>
+      </p:nvGrpSpPr>
+      <p:grpSpPr>
+        <a:xfrm>
+          <a:off x="0" y="0"/>
+          <a:ext cx="0" cy="0"/>
+          <a:chOff x="0" y="0"/>
+          <a:chExt cx="0" cy="0"/>
+        </a:xfrm>
+      </p:grpSpPr>
+      <p:sp>
+        <p:nvSpPr>
+          <p:cNvPr id="2" name="Title 1">
+            <a:extLst>
+              <a:ext uri="{FF2B5EF4-FFF2-40B4-BE49-F238E27FC236}">
+                <a16:creationId xmlns:a16="http://schemas.microsoft.com/office/drawing/2014/main" id="{06D8C261-2E32-49D7-80D9-4F2047E9BF29}"/>
+              </a:ext>
+            </a:extLst>
+          </p:cNvPr>
+          <p:cNvSpPr>
+            <a:spLocks noGrp="1"/>
+          </p:cNvSpPr>
+          <p:nvPr>
+            <p:ph type="title"/>
+          </p:nvPr>
+        </p:nvSpPr>
+        <p:spPr>
+          <a:xfrm>
+            <a:off x="1130969" y="340894"/>
+            <a:ext cx="9601200" cy="774032"/>
+          </a:xfrm>
+        </p:spPr>
+        <p:txBody>
+          <a:bodyPr/>
+          <a:lstStyle/>
+          <a:p>
+            <a:r>
+              <a:rPr lang="en-US" dirty="0"/>
+              <a:t>Results/Progress</a:t>
+            </a:r>
+          </a:p>
+        </p:txBody>
+      </p:sp>
+      <p:sp>
+        <p:nvSpPr>
+          <p:cNvPr id="3" name="Content Placeholder 2">
+            <a:extLst>
+              <a:ext uri="{FF2B5EF4-FFF2-40B4-BE49-F238E27FC236}">
+                <a16:creationId xmlns:a16="http://schemas.microsoft.com/office/drawing/2014/main" id="{C1ACB455-706E-4030-8E00-08B072C78575}"/>
+              </a:ext>
+            </a:extLst>
+          </p:cNvPr>
+          <p:cNvSpPr>
+            <a:spLocks noGrp="1"/>
+          </p:cNvSpPr>
+          <p:nvPr>
+            <p:ph idx="1"/>
+          </p:nvPr>
+        </p:nvSpPr>
+        <p:spPr>
+          <a:xfrm>
+            <a:off x="1130969" y="1114926"/>
+            <a:ext cx="9601200" cy="4407568"/>
+          </a:xfrm>
+        </p:spPr>
+        <p:txBody>
+          <a:bodyPr/>
+          <a:lstStyle/>
+          <a:p>
+            <a:endParaRPr lang="en-US" dirty="0"/>
+          </a:p>
+        </p:txBody>
+      </p:sp>
+    </p:spTree>
+    <p:extLst>
+      <p:ext uri="{BB962C8B-B14F-4D97-AF65-F5344CB8AC3E}">
+        <p14:creationId xmlns:p14="http://schemas.microsoft.com/office/powerpoint/2010/main" val="1295168599"/>
+      </p:ext>
+    </p:extLst>
+  </p:cSld>
+  <p:clrMapOvr>
+    <a:masterClrMapping/>
+  </p:clrMapOvr>
+</p:sld>
+</file>
+
+<file path=ppt/slides/slide14.xml><?xml version="1.0" encoding="utf-8"?>
+<p:sld xmlns:a="http://schemas.openxmlformats.org/drawingml/2006/main" xmlns:r="http://schemas.openxmlformats.org/officeDocument/2006/relationships" xmlns:p="http://schemas.openxmlformats.org/presentationml/2006/main">
+  <p:cSld>
     <p:bg>
       <p:bgPr>
         <a:solidFill>
@@ -6221,7 +6311,7 @@
 </p:sld>
 </file>
 
-<file path=ppt/slides/slide14.xml><?xml version="1.0" encoding="utf-8"?>
+<file path=ppt/slides/slide15.xml><?xml version="1.0" encoding="utf-8"?>
 <p:sld xmlns:a="http://schemas.openxmlformats.org/drawingml/2006/main" xmlns:r="http://schemas.openxmlformats.org/officeDocument/2006/relationships" xmlns:p="http://schemas.openxmlformats.org/presentationml/2006/main">
   <p:cSld>
     <p:bg>

</xml_diff>